<commit_message>
Updated the extended installation PPT with instructions for installation of Maven Integration for Eclipse plugin via Update Manager. Updated the Maven run configuration file.
</commit_message>
<xml_diff>
--- a/docs/groovy-tdd-installation-with-hidden-slides.pptx
+++ b/docs/groovy-tdd-installation-with-hidden-slides.pptx
@@ -5,7 +5,7 @@
     <p:sldMasterId id="2147483710" r:id="rId1"/>
   </p:sldMasterIdLst>
   <p:notesMasterIdLst>
-    <p:notesMasterId r:id="rId19"/>
+    <p:notesMasterId r:id="rId20"/>
   </p:notesMasterIdLst>
   <p:sldIdLst>
     <p:sldId id="256" r:id="rId2"/>
@@ -19,12 +19,13 @@
     <p:sldId id="259" r:id="rId10"/>
     <p:sldId id="268" r:id="rId11"/>
     <p:sldId id="265" r:id="rId12"/>
-    <p:sldId id="275" r:id="rId13"/>
-    <p:sldId id="272" r:id="rId14"/>
-    <p:sldId id="266" r:id="rId15"/>
-    <p:sldId id="273" r:id="rId16"/>
-    <p:sldId id="274" r:id="rId17"/>
-    <p:sldId id="269" r:id="rId18"/>
+    <p:sldId id="276" r:id="rId13"/>
+    <p:sldId id="275" r:id="rId14"/>
+    <p:sldId id="272" r:id="rId15"/>
+    <p:sldId id="266" r:id="rId16"/>
+    <p:sldId id="273" r:id="rId17"/>
+    <p:sldId id="274" r:id="rId18"/>
+    <p:sldId id="269" r:id="rId19"/>
   </p:sldIdLst>
   <p:sldSz cx="9144000" cy="6858000" type="screen4x3"/>
   <p:notesSz cx="7315200" cy="9601200"/>
@@ -5106,6 +5107,480 @@
 </file>
 
 <file path=ppt/slides/slide12.xml><?xml version="1.0" encoding="utf-8"?>
+<p:sld xmlns:a="http://schemas.openxmlformats.org/drawingml/2006/main" xmlns:r="http://schemas.openxmlformats.org/officeDocument/2006/relationships" xmlns:p="http://schemas.openxmlformats.org/presentationml/2006/main">
+  <p:cSld>
+    <p:spTree>
+      <p:nvGrpSpPr>
+        <p:cNvPr id="1" name=""/>
+        <p:cNvGrpSpPr/>
+        <p:nvPr/>
+      </p:nvGrpSpPr>
+      <p:grpSpPr>
+        <a:xfrm>
+          <a:off x="0" y="0"/>
+          <a:ext cx="0" cy="0"/>
+          <a:chOff x="0" y="0"/>
+          <a:chExt cx="0" cy="0"/>
+        </a:xfrm>
+      </p:grpSpPr>
+      <p:sp>
+        <p:nvSpPr>
+          <p:cNvPr id="2" name="Title 1"/>
+          <p:cNvSpPr>
+            <a:spLocks noGrp="1"/>
+          </p:cNvSpPr>
+          <p:nvPr>
+            <p:ph type="ctrTitle"/>
+          </p:nvPr>
+        </p:nvSpPr>
+        <p:spPr>
+          <a:xfrm>
+            <a:off x="685800" y="570922"/>
+            <a:ext cx="7772400" cy="985870"/>
+          </a:xfrm>
+        </p:spPr>
+        <p:txBody>
+          <a:bodyPr anchor="t">
+            <a:normAutofit fontScale="90000"/>
+          </a:bodyPr>
+          <a:lstStyle/>
+          <a:p>
+            <a:r>
+              <a:rPr lang="en-US" dirty="0" smtClean="0"/>
+              <a:t>Eclipse </a:t>
+            </a:r>
+            <a:r>
+              <a:rPr lang="en-US" dirty="0"/>
+              <a:t>Plugin </a:t>
+            </a:r>
+            <a:r>
+              <a:rPr lang="en-US" dirty="0" smtClean="0"/>
+              <a:t>Installation</a:t>
+            </a:r>
+            <a:br>
+              <a:rPr lang="en-US" dirty="0" smtClean="0"/>
+            </a:br>
+            <a:r>
+              <a:rPr lang="en-US" sz="2700" dirty="0" smtClean="0"/>
+              <a:t>Maven Integration for </a:t>
+            </a:r>
+            <a:r>
+              <a:rPr lang="en-US" sz="2700" dirty="0" smtClean="0"/>
+              <a:t>Eclipse via Update Manager</a:t>
+            </a:r>
+            <a:endParaRPr lang="en-US" sz="2700" dirty="0"/>
+          </a:p>
+        </p:txBody>
+      </p:sp>
+      <p:sp>
+        <p:nvSpPr>
+          <p:cNvPr id="3" name="Text Placeholder 2"/>
+          <p:cNvSpPr>
+            <a:spLocks noGrp="1"/>
+          </p:cNvSpPr>
+          <p:nvPr>
+            <p:ph type="body" sz="quarter" idx="13"/>
+          </p:nvPr>
+        </p:nvSpPr>
+        <p:spPr>
+          <a:xfrm>
+            <a:off x="685803" y="1628800"/>
+            <a:ext cx="7721303" cy="4104456"/>
+          </a:xfrm>
+        </p:spPr>
+        <p:txBody>
+          <a:bodyPr/>
+          <a:lstStyle/>
+          <a:p>
+            <a:pPr marL="57150" indent="0">
+              <a:buNone/>
+            </a:pPr>
+            <a:r>
+              <a:rPr lang="en-US" sz="2000" dirty="0" smtClean="0"/>
+              <a:t>This plugin </a:t>
+            </a:r>
+            <a:r>
+              <a:rPr lang="en-US" sz="2000" dirty="0" smtClean="0"/>
+              <a:t>is </a:t>
+            </a:r>
+            <a:r>
+              <a:rPr lang="en-US" sz="2000" dirty="0" smtClean="0"/>
+              <a:t>necessary to </a:t>
+            </a:r>
+            <a:r>
+              <a:rPr lang="en-US" sz="2000" dirty="0" smtClean="0"/>
+              <a:t>install if you use the </a:t>
+            </a:r>
+            <a:r>
+              <a:rPr lang="en-US" sz="2000" dirty="0" smtClean="0"/>
+              <a:t>Eclipse </a:t>
+            </a:r>
+            <a:r>
+              <a:rPr lang="en-US" sz="2000" dirty="0" smtClean="0"/>
+              <a:t>Standard package. The plugin </a:t>
+            </a:r>
+            <a:r>
+              <a:rPr lang="en-US" sz="2000" dirty="0"/>
+              <a:t>provides comprehensive Maven integration for </a:t>
+            </a:r>
+            <a:r>
+              <a:rPr lang="en-US" sz="2000" dirty="0" smtClean="0"/>
+              <a:t>Eclipse.</a:t>
+            </a:r>
+          </a:p>
+          <a:p>
+            <a:pPr marL="57150" indent="0">
+              <a:buNone/>
+            </a:pPr>
+            <a:endParaRPr lang="en-US" sz="2000" dirty="0"/>
+          </a:p>
+          <a:p>
+            <a:pPr marL="400050">
+              <a:buFont typeface="Arial"/>
+              <a:buChar char="•"/>
+            </a:pPr>
+            <a:r>
+              <a:rPr lang="en-US" sz="2000" dirty="0"/>
+              <a:t>To install the plugin, select Help → Install New Software...</a:t>
+            </a:r>
+          </a:p>
+          <a:p>
+            <a:pPr marL="400050">
+              <a:buFont typeface="Arial"/>
+              <a:buChar char="•"/>
+            </a:pPr>
+            <a:r>
+              <a:rPr lang="en-US" sz="2000" dirty="0"/>
+              <a:t>Paste the following URL into the “Work with:” field and hit Enter</a:t>
+            </a:r>
+          </a:p>
+          <a:p>
+            <a:pPr marL="400050">
+              <a:buFont typeface="Arial"/>
+              <a:buChar char="•"/>
+            </a:pPr>
+            <a:endParaRPr lang="en-US" sz="2000" dirty="0"/>
+          </a:p>
+          <a:p>
+            <a:pPr marL="400050">
+              <a:buFont typeface="Arial"/>
+              <a:buChar char="•"/>
+            </a:pPr>
+            <a:endParaRPr lang="en-US" sz="2000" dirty="0"/>
+          </a:p>
+          <a:p>
+            <a:pPr marL="400050">
+              <a:buFont typeface="Arial"/>
+              <a:buChar char="•"/>
+            </a:pPr>
+            <a:r>
+              <a:rPr lang="en-US" sz="2000" dirty="0" smtClean="0"/>
+              <a:t>Install </a:t>
+            </a:r>
+            <a:r>
+              <a:rPr lang="en-US" sz="2000" dirty="0"/>
+              <a:t>feature:</a:t>
+            </a:r>
+          </a:p>
+          <a:p>
+            <a:pPr marL="857250" lvl="1" indent="-342900">
+              <a:buFont typeface="Wingdings" charset="2"/>
+              <a:buChar char="q"/>
+            </a:pPr>
+            <a:r>
+              <a:rPr lang="en-US" sz="1800" dirty="0" smtClean="0"/>
+              <a:t>Maven Integration for </a:t>
+            </a:r>
+            <a:r>
+              <a:rPr lang="en-US" sz="1800" dirty="0" err="1" smtClean="0"/>
+              <a:t>Eclispe</a:t>
+            </a:r>
+            <a:endParaRPr lang="en-US" sz="1800" dirty="0"/>
+          </a:p>
+          <a:p>
+            <a:pPr marL="1314450" lvl="2" indent="-342900">
+              <a:buFont typeface="Wingdings" charset="2"/>
+              <a:buChar char="q"/>
+            </a:pPr>
+            <a:r>
+              <a:rPr lang="en-US" sz="1600" dirty="0"/>
+              <a:t>m</a:t>
+            </a:r>
+            <a:r>
+              <a:rPr lang="en-US" sz="1600" dirty="0" smtClean="0"/>
+              <a:t>2e -  Maven Integrations for Eclipse v1.4.0</a:t>
+            </a:r>
+          </a:p>
+          <a:p>
+            <a:pPr marL="1314450" lvl="2" indent="-342900">
+              <a:buFont typeface="Wingdings" charset="2"/>
+              <a:buChar char="q"/>
+            </a:pPr>
+            <a:r>
+              <a:rPr lang="en-US" sz="1600" dirty="0"/>
+              <a:t>m</a:t>
+            </a:r>
+            <a:r>
+              <a:rPr lang="en-US" sz="1600" dirty="0" smtClean="0"/>
+              <a:t>2e – slf4j over </a:t>
+            </a:r>
+            <a:r>
+              <a:rPr lang="en-US" sz="1600" dirty="0" err="1" smtClean="0"/>
+              <a:t>logback</a:t>
+            </a:r>
+            <a:r>
+              <a:rPr lang="en-US" sz="1600" dirty="0" smtClean="0"/>
+              <a:t> logging (Optional) v1.4.0</a:t>
+            </a:r>
+          </a:p>
+          <a:p>
+            <a:pPr marL="1314450" lvl="2" indent="-342900">
+              <a:buFont typeface="Wingdings" charset="2"/>
+              <a:buChar char="q"/>
+            </a:pPr>
+            <a:endParaRPr lang="en-US" sz="1600" dirty="0"/>
+          </a:p>
+        </p:txBody>
+      </p:sp>
+      <p:sp>
+        <p:nvSpPr>
+          <p:cNvPr id="4" name="Text Placeholder 2"/>
+          <p:cNvSpPr txBox="1">
+            <a:spLocks/>
+          </p:cNvSpPr>
+          <p:nvPr/>
+        </p:nvSpPr>
+        <p:spPr>
+          <a:xfrm>
+            <a:off x="1187624" y="3789040"/>
+            <a:ext cx="6048672" cy="594066"/>
+          </a:xfrm>
+          <a:prstGeom prst="roundRect">
+            <a:avLst/>
+          </a:prstGeom>
+          <a:solidFill>
+            <a:schemeClr val="accent1">
+              <a:lumMod val="20000"/>
+              <a:lumOff val="80000"/>
+            </a:schemeClr>
+          </a:solidFill>
+          <a:ln w="12700" cap="rnd" cmpd="sng">
+            <a:solidFill>
+              <a:schemeClr val="tx1"/>
+            </a:solidFill>
+            <a:round/>
+          </a:ln>
+          <a:effectLst>
+            <a:outerShdw blurRad="50800" dist="38100" dir="2700000" algn="tl" rotWithShape="0">
+              <a:schemeClr val="accent1">
+                <a:lumMod val="75000"/>
+                <a:alpha val="43000"/>
+              </a:schemeClr>
+            </a:outerShdw>
+          </a:effectLst>
+        </p:spPr>
+        <p:txBody>
+          <a:bodyPr anchor="ctr"/>
+          <a:lstStyle>
+            <a:lvl1pPr marL="342900" indent="-342900" algn="l" defTabSz="457200" rtl="0" eaLnBrk="1" fontAlgn="base" hangingPunct="1">
+              <a:spcBef>
+                <a:spcPct val="20000"/>
+              </a:spcBef>
+              <a:spcAft>
+                <a:spcPct val="0"/>
+              </a:spcAft>
+              <a:buFont typeface="Arial" charset="0"/>
+              <a:buChar char="•"/>
+              <a:defRPr sz="2400" kern="1200">
+                <a:solidFill>
+                  <a:schemeClr val="tx1"/>
+                </a:solidFill>
+                <a:latin typeface="+mn-lt"/>
+                <a:ea typeface="ＭＳ Ｐゴシック" pitchFamily="-111" charset="-128"/>
+                <a:cs typeface="ＭＳ Ｐゴシック" pitchFamily="-111" charset="-128"/>
+              </a:defRPr>
+            </a:lvl1pPr>
+            <a:lvl2pPr marL="742950" indent="-285750" algn="l" defTabSz="457200" rtl="0" eaLnBrk="1" fontAlgn="base" hangingPunct="1">
+              <a:spcBef>
+                <a:spcPct val="20000"/>
+              </a:spcBef>
+              <a:spcAft>
+                <a:spcPct val="0"/>
+              </a:spcAft>
+              <a:buFont typeface="Arial" charset="0"/>
+              <a:buChar char="–"/>
+              <a:defRPr sz="2200" kern="1200">
+                <a:solidFill>
+                  <a:schemeClr val="tx1"/>
+                </a:solidFill>
+                <a:latin typeface="+mn-lt"/>
+                <a:ea typeface="ＭＳ Ｐゴシック" pitchFamily="-111" charset="-128"/>
+                <a:cs typeface="ＭＳ Ｐゴシック"/>
+              </a:defRPr>
+            </a:lvl2pPr>
+            <a:lvl3pPr marL="1143000" indent="-228600" algn="l" defTabSz="457200" rtl="0" eaLnBrk="1" fontAlgn="base" hangingPunct="1">
+              <a:spcBef>
+                <a:spcPct val="20000"/>
+              </a:spcBef>
+              <a:spcAft>
+                <a:spcPct val="0"/>
+              </a:spcAft>
+              <a:buFont typeface="Calibri" pitchFamily="34" charset="0"/>
+              <a:buChar char="»"/>
+              <a:defRPr sz="2000" kern="1200">
+                <a:solidFill>
+                  <a:schemeClr val="tx1"/>
+                </a:solidFill>
+                <a:latin typeface="+mn-lt"/>
+                <a:ea typeface="ＭＳ Ｐゴシック" pitchFamily="-111" charset="-128"/>
+                <a:cs typeface="ＭＳ Ｐゴシック"/>
+              </a:defRPr>
+            </a:lvl3pPr>
+            <a:lvl4pPr marL="1600200" indent="-228600" algn="l" defTabSz="457200" rtl="0" eaLnBrk="1" fontAlgn="base" hangingPunct="1">
+              <a:spcBef>
+                <a:spcPct val="20000"/>
+              </a:spcBef>
+              <a:spcAft>
+                <a:spcPct val="0"/>
+              </a:spcAft>
+              <a:buFont typeface="Arial" charset="0"/>
+              <a:buChar char="–"/>
+              <a:defRPr sz="1800" kern="1200">
+                <a:solidFill>
+                  <a:schemeClr val="tx1">
+                    <a:lumMod val="75000"/>
+                    <a:lumOff val="25000"/>
+                  </a:schemeClr>
+                </a:solidFill>
+                <a:latin typeface="+mn-lt"/>
+                <a:ea typeface="ＭＳ Ｐゴシック" pitchFamily="-111" charset="-128"/>
+                <a:cs typeface="ＭＳ Ｐゴシック"/>
+              </a:defRPr>
+            </a:lvl4pPr>
+            <a:lvl5pPr marL="2057400" indent="-228600" algn="l" defTabSz="457200" rtl="0" eaLnBrk="1" fontAlgn="base" hangingPunct="1">
+              <a:spcBef>
+                <a:spcPct val="20000"/>
+              </a:spcBef>
+              <a:spcAft>
+                <a:spcPct val="0"/>
+              </a:spcAft>
+              <a:buFont typeface="Arial" charset="0"/>
+              <a:buChar char="»"/>
+              <a:defRPr sz="1800" kern="1200">
+                <a:solidFill>
+                  <a:schemeClr val="tx1">
+                    <a:lumMod val="75000"/>
+                    <a:lumOff val="25000"/>
+                  </a:schemeClr>
+                </a:solidFill>
+                <a:latin typeface="+mn-lt"/>
+                <a:ea typeface="ＭＳ Ｐゴシック" pitchFamily="-111" charset="-128"/>
+                <a:cs typeface="ＭＳ Ｐゴシック"/>
+              </a:defRPr>
+            </a:lvl5pPr>
+            <a:lvl6pPr marL="2514600" indent="-228600" algn="l" defTabSz="457200" rtl="0" eaLnBrk="1" latinLnBrk="0" hangingPunct="1">
+              <a:spcBef>
+                <a:spcPct val="20000"/>
+              </a:spcBef>
+              <a:buFont typeface="Arial"/>
+              <a:buChar char="•"/>
+              <a:defRPr sz="2000" kern="1200">
+                <a:solidFill>
+                  <a:schemeClr val="tx1"/>
+                </a:solidFill>
+                <a:latin typeface="+mn-lt"/>
+                <a:ea typeface="+mn-ea"/>
+                <a:cs typeface="+mn-cs"/>
+              </a:defRPr>
+            </a:lvl6pPr>
+            <a:lvl7pPr marL="2971800" indent="-228600" algn="l" defTabSz="457200" rtl="0" eaLnBrk="1" latinLnBrk="0" hangingPunct="1">
+              <a:spcBef>
+                <a:spcPct val="20000"/>
+              </a:spcBef>
+              <a:buFont typeface="Arial"/>
+              <a:buChar char="•"/>
+              <a:defRPr sz="2000" kern="1200">
+                <a:solidFill>
+                  <a:schemeClr val="tx1"/>
+                </a:solidFill>
+                <a:latin typeface="+mn-lt"/>
+                <a:ea typeface="+mn-ea"/>
+                <a:cs typeface="+mn-cs"/>
+              </a:defRPr>
+            </a:lvl7pPr>
+            <a:lvl8pPr marL="3429000" indent="-228600" algn="l" defTabSz="457200" rtl="0" eaLnBrk="1" latinLnBrk="0" hangingPunct="1">
+              <a:spcBef>
+                <a:spcPct val="20000"/>
+              </a:spcBef>
+              <a:buFont typeface="Arial"/>
+              <a:buChar char="•"/>
+              <a:defRPr sz="2000" kern="1200">
+                <a:solidFill>
+                  <a:schemeClr val="tx1"/>
+                </a:solidFill>
+                <a:latin typeface="+mn-lt"/>
+                <a:ea typeface="+mn-ea"/>
+                <a:cs typeface="+mn-cs"/>
+              </a:defRPr>
+            </a:lvl8pPr>
+            <a:lvl9pPr marL="3886200" indent="-228600" algn="l" defTabSz="457200" rtl="0" eaLnBrk="1" latinLnBrk="0" hangingPunct="1">
+              <a:spcBef>
+                <a:spcPct val="20000"/>
+              </a:spcBef>
+              <a:buFont typeface="Arial"/>
+              <a:buChar char="•"/>
+              <a:defRPr sz="2000" kern="1200">
+                <a:solidFill>
+                  <a:schemeClr val="tx1"/>
+                </a:solidFill>
+                <a:latin typeface="+mn-lt"/>
+                <a:ea typeface="+mn-ea"/>
+                <a:cs typeface="+mn-cs"/>
+              </a:defRPr>
+            </a:lvl9pPr>
+          </a:lstStyle>
+          <a:p>
+            <a:pPr marL="0" indent="0">
+              <a:buNone/>
+            </a:pPr>
+            <a:r>
+              <a:rPr lang="en-US" sz="1800" dirty="0"/>
+              <a:t>http://</a:t>
+            </a:r>
+            <a:r>
+              <a:rPr lang="en-US" sz="1800" dirty="0" err="1"/>
+              <a:t>download.eclipse.org</a:t>
+            </a:r>
+            <a:r>
+              <a:rPr lang="en-US" sz="1800" dirty="0"/>
+              <a:t>/technology/m2e/releases</a:t>
+            </a:r>
+            <a:endParaRPr lang="en-US" sz="1800" dirty="0"/>
+          </a:p>
+        </p:txBody>
+      </p:sp>
+    </p:spTree>
+    <p:extLst>
+      <p:ext uri="{BB962C8B-B14F-4D97-AF65-F5344CB8AC3E}">
+        <p14:creationId xmlns:p14="http://schemas.microsoft.com/office/powerpoint/2010/main" val="1681094884"/>
+      </p:ext>
+    </p:extLst>
+  </p:cSld>
+  <p:clrMapOvr>
+    <a:masterClrMapping/>
+  </p:clrMapOvr>
+  <mc:AlternateContent xmlns:mc="http://schemas.openxmlformats.org/markup-compatibility/2006">
+    <mc:Choice xmlns:p14="http://schemas.microsoft.com/office/powerpoint/2010/main" Requires="p14">
+      <p:transition spd="slow" p14:dur="2000"/>
+    </mc:Choice>
+    <mc:Fallback>
+      <p:transition xmlns:p14="http://schemas.microsoft.com/office/powerpoint/2010/main" spd="slow"/>
+    </mc:Fallback>
+  </mc:AlternateContent>
+</p:sld>
+</file>
+
+<file path=ppt/slides/slide13.xml><?xml version="1.0" encoding="utf-8"?>
 <p:sld xmlns:a="http://schemas.openxmlformats.org/drawingml/2006/main" xmlns:r="http://schemas.openxmlformats.org/officeDocument/2006/relationships" xmlns:p="http://schemas.openxmlformats.org/presentationml/2006/main" show="0">
   <p:cSld>
     <p:spTree>
@@ -5135,12 +5610,12 @@
         <p:spPr>
           <a:xfrm>
             <a:off x="685800" y="570922"/>
-            <a:ext cx="7772400" cy="1345910"/>
+            <a:ext cx="7772400" cy="985870"/>
           </a:xfrm>
         </p:spPr>
         <p:txBody>
           <a:bodyPr anchor="t">
-            <a:normAutofit/>
+            <a:normAutofit fontScale="90000"/>
           </a:bodyPr>
           <a:lstStyle/>
           <a:p>
@@ -5161,7 +5636,11 @@
             </a:br>
             <a:r>
               <a:rPr lang="en-US" sz="2700" dirty="0" smtClean="0"/>
-              <a:t>Maven Integration for Eclipse 1.4</a:t>
+              <a:t>Maven Integration for </a:t>
+            </a:r>
+            <a:r>
+              <a:rPr lang="en-US" sz="2700" dirty="0" smtClean="0"/>
+              <a:t>Eclipse via Marketplace</a:t>
             </a:r>
             <a:endParaRPr lang="en-US" sz="2700" dirty="0"/>
           </a:p>
@@ -5179,7 +5658,7 @@
         </p:nvSpPr>
         <p:spPr>
           <a:xfrm>
-            <a:off x="685803" y="1988840"/>
+            <a:off x="685803" y="1628800"/>
             <a:ext cx="7721303" cy="3672407"/>
           </a:xfrm>
         </p:spPr>
@@ -5191,40 +5670,8 @@
               <a:buNone/>
             </a:pPr>
             <a:r>
-              <a:rPr lang="en-US" sz="2000" dirty="0" smtClean="0"/>
-              <a:t>This plugin is only necessary to install </a:t>
-            </a:r>
-            <a:r>
               <a:rPr lang="en-US" sz="2000" dirty="0"/>
-              <a:t>i</a:t>
-            </a:r>
-            <a:r>
-              <a:rPr lang="en-US" sz="2000" dirty="0" smtClean="0"/>
-              <a:t>f you you don’t use recommended Eclipse </a:t>
-            </a:r>
-            <a:r>
-              <a:rPr lang="en-US" sz="2000" dirty="0"/>
-              <a:t>IDE for Java EE </a:t>
-            </a:r>
-            <a:r>
-              <a:rPr lang="en-US" sz="2000" dirty="0" smtClean="0"/>
-              <a:t>Developers package</a:t>
-            </a:r>
-            <a:r>
-              <a:rPr lang="en-US" sz="2000" b="1" dirty="0" smtClean="0"/>
-              <a:t>. </a:t>
-            </a:r>
-            <a:r>
-              <a:rPr lang="en-US" sz="2000" dirty="0" smtClean="0"/>
-              <a:t>If you have another package, </a:t>
-            </a:r>
-            <a:r>
-              <a:rPr lang="en-US" sz="2000" dirty="0" err="1" smtClean="0"/>
-              <a:t>e.g</a:t>
-            </a:r>
-            <a:r>
-              <a:rPr lang="en-US" sz="2000" dirty="0" smtClean="0"/>
-              <a:t> Eclipse Standard 4.3.1, you must install the plugin to get the Maven build support.</a:t>
+              <a:t>This plugin is necessary to install if you use the Eclipse Standard package. The plugin provides comprehensive Maven integration for Eclipse.</a:t>
             </a:r>
           </a:p>
           <a:p>
@@ -5321,7 +5768,7 @@
 </p:sld>
 </file>
 
-<file path=ppt/slides/slide13.xml><?xml version="1.0" encoding="utf-8"?>
+<file path=ppt/slides/slide14.xml><?xml version="1.0" encoding="utf-8"?>
 <p:sld xmlns:a="http://schemas.openxmlformats.org/drawingml/2006/main" xmlns:r="http://schemas.openxmlformats.org/officeDocument/2006/relationships" xmlns:p="http://schemas.openxmlformats.org/presentationml/2006/main">
   <p:cSld>
     <p:spTree>
@@ -5713,7 +6160,7 @@
 </p:sld>
 </file>
 
-<file path=ppt/slides/slide14.xml><?xml version="1.0" encoding="utf-8"?>
+<file path=ppt/slides/slide15.xml><?xml version="1.0" encoding="utf-8"?>
 <p:sld xmlns:a="http://schemas.openxmlformats.org/drawingml/2006/main" xmlns:r="http://schemas.openxmlformats.org/officeDocument/2006/relationships" xmlns:p="http://schemas.openxmlformats.org/presentationml/2006/main" show="0">
   <p:cSld>
     <p:spTree>
@@ -6110,7 +6557,7 @@
 </p:sld>
 </file>
 
-<file path=ppt/slides/slide15.xml><?xml version="1.0" encoding="utf-8"?>
+<file path=ppt/slides/slide16.xml><?xml version="1.0" encoding="utf-8"?>
 <p:sld xmlns:a="http://schemas.openxmlformats.org/drawingml/2006/main" xmlns:r="http://schemas.openxmlformats.org/officeDocument/2006/relationships" xmlns:p="http://schemas.openxmlformats.org/presentationml/2006/main">
   <p:cSld>
     <p:spTree>
@@ -6297,7 +6744,7 @@
 </p:sld>
 </file>
 
-<file path=ppt/slides/slide16.xml><?xml version="1.0" encoding="utf-8"?>
+<file path=ppt/slides/slide17.xml><?xml version="1.0" encoding="utf-8"?>
 <p:sld xmlns:a="http://schemas.openxmlformats.org/drawingml/2006/main" xmlns:r="http://schemas.openxmlformats.org/officeDocument/2006/relationships" xmlns:p="http://schemas.openxmlformats.org/presentationml/2006/main">
   <p:cSld>
     <p:spTree>
@@ -6697,7 +7144,7 @@
 </p:sld>
 </file>
 
-<file path=ppt/slides/slide17.xml><?xml version="1.0" encoding="utf-8"?>
+<file path=ppt/slides/slide18.xml><?xml version="1.0" encoding="utf-8"?>
 <p:sld xmlns:a="http://schemas.openxmlformats.org/drawingml/2006/main" xmlns:r="http://schemas.openxmlformats.org/officeDocument/2006/relationships" xmlns:p="http://schemas.openxmlformats.org/presentationml/2006/main" show="0">
   <p:cSld>
     <p:spTree>

</xml_diff>